<commit_message>
Worked on Final Presentation
</commit_message>
<xml_diff>
--- a/Unums_FinalPresentation.pptx
+++ b/Unums_FinalPresentation.pptx
@@ -19,9 +19,9 @@
     <p:sldId id="260" r:id="rId7"/>
     <p:sldId id="261" r:id="rId8"/>
     <p:sldId id="262" r:id="rId9"/>
-    <p:sldId id="263" r:id="rId10"/>
-    <p:sldId id="264" r:id="rId11"/>
-    <p:sldId id="265" r:id="rId12"/>
+    <p:sldId id="264" r:id="rId10"/>
+    <p:sldId id="263" r:id="rId11"/>
+    <p:sldId id="268" r:id="rId12"/>
     <p:sldId id="266" r:id="rId13"/>
   </p:sldIdLst>
   <p:sldSz cx="9144000" cy="6858000" type="screen4x3"/>
@@ -248,7 +248,7 @@
           <a:p>
             <a:fld id="{CF40E7CB-B090-6140-958A-EAE3EFECA0AB}" type="datetimeFigureOut">
               <a:rPr lang="en-US" smtClean="0"/>
-              <a:t>2/8/2017</a:t>
+              <a:t>2/9/2017</a:t>
             </a:fld>
             <a:endParaRPr lang="en-US"/>
           </a:p>
@@ -414,7 +414,7 @@
           <a:p>
             <a:fld id="{CC8FA2BA-21CB-AC41-BDFF-8AF1F2C23B5F}" type="datetimeFigureOut">
               <a:rPr lang="en-US" smtClean="0"/>
-              <a:t>2/8/2017</a:t>
+              <a:t>2/9/2017</a:t>
             </a:fld>
             <a:endParaRPr lang="en-US"/>
           </a:p>
@@ -681,6 +681,90 @@
     </a:lvl9pPr>
   </p:notesStyle>
 </p:notesMaster>
+</file>
+
+<file path=ppt/notesSlides/notesSlide1.xml><?xml version="1.0" encoding="utf-8"?>
+<p:notes xmlns:a="http://schemas.openxmlformats.org/drawingml/2006/main" xmlns:r="http://schemas.openxmlformats.org/officeDocument/2006/relationships" xmlns:p="http://schemas.openxmlformats.org/presentationml/2006/main">
+  <p:cSld>
+    <p:spTree>
+      <p:nvGrpSpPr>
+        <p:cNvPr id="1" name=""/>
+        <p:cNvGrpSpPr/>
+        <p:nvPr/>
+      </p:nvGrpSpPr>
+      <p:grpSpPr>
+        <a:xfrm>
+          <a:off x="0" y="0"/>
+          <a:ext cx="0" cy="0"/>
+          <a:chOff x="0" y="0"/>
+          <a:chExt cx="0" cy="0"/>
+        </a:xfrm>
+      </p:grpSpPr>
+      <p:sp>
+        <p:nvSpPr>
+          <p:cNvPr id="2" name="Slide Image Placeholder 1"/>
+          <p:cNvSpPr>
+            <a:spLocks noGrp="1" noRot="1" noChangeAspect="1"/>
+          </p:cNvSpPr>
+          <p:nvPr>
+            <p:ph type="sldImg"/>
+          </p:nvPr>
+        </p:nvSpPr>
+        <p:spPr/>
+      </p:sp>
+      <p:sp>
+        <p:nvSpPr>
+          <p:cNvPr id="3" name="Notes Placeholder 2"/>
+          <p:cNvSpPr>
+            <a:spLocks noGrp="1"/>
+          </p:cNvSpPr>
+          <p:nvPr>
+            <p:ph type="body" idx="1"/>
+          </p:nvPr>
+        </p:nvSpPr>
+        <p:spPr/>
+        <p:txBody>
+          <a:bodyPr/>
+          <a:lstStyle/>
+          <a:p>
+            <a:endParaRPr lang="en-AU" dirty="0"/>
+          </a:p>
+        </p:txBody>
+      </p:sp>
+      <p:sp>
+        <p:nvSpPr>
+          <p:cNvPr id="4" name="Slide Number Placeholder 3"/>
+          <p:cNvSpPr>
+            <a:spLocks noGrp="1"/>
+          </p:cNvSpPr>
+          <p:nvPr>
+            <p:ph type="sldNum" sz="quarter" idx="10"/>
+          </p:nvPr>
+        </p:nvSpPr>
+        <p:spPr/>
+        <p:txBody>
+          <a:bodyPr/>
+          <a:lstStyle/>
+          <a:p>
+            <a:fld id="{3FA75954-64D3-3547-9E41-BA5D253C709A}" type="slidenum">
+              <a:rPr lang="en-US" smtClean="0"/>
+              <a:t>2</a:t>
+            </a:fld>
+            <a:endParaRPr lang="en-US"/>
+          </a:p>
+        </p:txBody>
+      </p:sp>
+    </p:spTree>
+    <p:extLst>
+      <p:ext uri="{BB962C8B-B14F-4D97-AF65-F5344CB8AC3E}">
+        <p14:creationId xmlns:p14="http://schemas.microsoft.com/office/powerpoint/2010/main" val="1255031316"/>
+      </p:ext>
+    </p:extLst>
+  </p:cSld>
+  <p:clrMapOvr>
+    <a:masterClrMapping/>
+  </p:clrMapOvr>
+</p:notes>
 </file>
 
 <file path=ppt/slideLayouts/slideLayout1.xml><?xml version="1.0" encoding="utf-8"?>
@@ -2502,50 +2586,83 @@
             <p:ph type="body" sz="quarter" idx="14"/>
           </p:nvPr>
         </p:nvSpPr>
-        <p:spPr/>
-        <p:txBody>
-          <a:bodyPr/>
+        <p:spPr>
+          <a:xfrm>
+            <a:off x="246137" y="1158876"/>
+            <a:ext cx="8674026" cy="2585534"/>
+          </a:xfrm>
+        </p:spPr>
+        <p:txBody>
+          <a:bodyPr>
+            <a:normAutofit/>
+          </a:bodyPr>
           <a:lstStyle/>
           <a:p>
             <a:r>
               <a:rPr lang="en-US" dirty="0"/>
-              <a:t>Heading</a:t>
-            </a:r>
-          </a:p>
-          <a:p>
-            <a:pPr lvl="1"/>
-            <a:r>
-              <a:rPr lang="en-US" dirty="0"/>
-              <a:t>Text</a:t>
+              <a:t>Using </a:t>
+            </a:r>
+            <a:r>
+              <a:rPr lang="en-US" dirty="0" err="1"/>
+              <a:t>Uboxes</a:t>
+            </a:r>
+            <a:r>
+              <a:rPr lang="en-US" dirty="0"/>
+              <a:t> we can utilize the “Paint Bucket” method for evaluating definite integrals with ease</a:t>
             </a:r>
           </a:p>
           <a:p>
             <a:pPr lvl="2"/>
             <a:r>
               <a:rPr lang="en-US" dirty="0"/>
-              <a:t>Bullet 1</a:t>
-            </a:r>
-          </a:p>
-          <a:p>
-            <a:pPr lvl="3"/>
-            <a:r>
-              <a:rPr lang="en-US" dirty="0"/>
-              <a:t>Bullet 2</a:t>
-            </a:r>
-          </a:p>
-          <a:p>
-            <a:pPr lvl="4"/>
-            <a:r>
-              <a:rPr lang="en-US" dirty="0"/>
-              <a:t>Bullet 3</a:t>
-            </a:r>
-          </a:p>
-        </p:txBody>
-      </p:sp>
+              <a:t>Works by filling up the domain of integration with </a:t>
+            </a:r>
+            <a:r>
+              <a:rPr lang="en-US" dirty="0" err="1"/>
+              <a:t>Uboxes</a:t>
+            </a:r>
+            <a:r>
+              <a:rPr lang="en-US" dirty="0"/>
+              <a:t> and finding their “Area”</a:t>
+            </a:r>
+          </a:p>
+          <a:p>
+            <a:pPr lvl="2"/>
+            <a:r>
+              <a:rPr lang="en-US" dirty="0"/>
+              <a:t>The Paint Bucket method can be done almost entirely in parallel!</a:t>
+            </a:r>
+          </a:p>
+        </p:txBody>
+      </p:sp>
+      <p:pic>
+        <p:nvPicPr>
+          <p:cNvPr id="5" name="Picture 4"/>
+          <p:cNvPicPr>
+            <a:picLocks noChangeAspect="1"/>
+          </p:cNvPicPr>
+          <p:nvPr/>
+        </p:nvPicPr>
+        <p:blipFill>
+          <a:blip r:embed="rId2"/>
+          <a:stretch>
+            <a:fillRect/>
+          </a:stretch>
+        </p:blipFill>
+        <p:spPr>
+          <a:xfrm>
+            <a:off x="246137" y="3825813"/>
+            <a:ext cx="2638646" cy="2551418"/>
+          </a:xfrm>
+          <a:prstGeom prst="rect">
+            <a:avLst/>
+          </a:prstGeom>
+        </p:spPr>
+      </p:pic>
     </p:spTree>
     <p:extLst>
       <p:ext uri="{BB962C8B-B14F-4D97-AF65-F5344CB8AC3E}">
-        <p14:creationId xmlns:p14="http://schemas.microsoft.com/office/powerpoint/2010/main" val="1316505308"/>
+        <p14:creationId xmlns:p14="http://schemas.microsoft.com/office/powerpoint/2010/main" val="4062126938"/>
       </p:ext>
     </p:extLst>
   </p:cSld>
@@ -2584,8 +2701,8 @@
         </p:nvSpPr>
         <p:spPr>
           <a:xfrm>
-            <a:off x="1909398" y="132080"/>
-            <a:ext cx="5347504" cy="650240"/>
+            <a:off x="1741338" y="165548"/>
+            <a:ext cx="5683623" cy="650240"/>
           </a:xfrm>
         </p:spPr>
         <p:txBody>
@@ -2596,7 +2713,7 @@
           <a:p>
             <a:r>
               <a:rPr lang="en-US" dirty="0"/>
-              <a:t>Solving Real Problems</a:t>
+              <a:t>Application : Pendulums</a:t>
             </a:r>
           </a:p>
         </p:txBody>
@@ -2623,60 +2740,162 @@
           </a:p>
         </p:txBody>
       </p:sp>
-      <p:sp>
-        <p:nvSpPr>
-          <p:cNvPr id="4" name="Text Placeholder 3"/>
-          <p:cNvSpPr>
-            <a:spLocks noGrp="1"/>
-          </p:cNvSpPr>
-          <p:nvPr>
-            <p:ph type="body" sz="quarter" idx="14"/>
-          </p:nvPr>
-        </p:nvSpPr>
-        <p:spPr/>
-        <p:txBody>
-          <a:bodyPr/>
-          <a:lstStyle/>
-          <a:p>
-            <a:r>
-              <a:rPr lang="en-US" dirty="0"/>
-              <a:t>Heading</a:t>
-            </a:r>
-          </a:p>
-          <a:p>
-            <a:pPr lvl="1"/>
-            <a:r>
-              <a:rPr lang="en-US" dirty="0"/>
-              <a:t>Text</a:t>
-            </a:r>
-          </a:p>
-          <a:p>
-            <a:pPr lvl="2"/>
-            <a:r>
-              <a:rPr lang="en-US" dirty="0"/>
-              <a:t>Bullet 1</a:t>
-            </a:r>
-          </a:p>
-          <a:p>
-            <a:pPr lvl="3"/>
-            <a:r>
-              <a:rPr lang="en-US" dirty="0"/>
-              <a:t>Bullet 2</a:t>
-            </a:r>
-          </a:p>
-          <a:p>
-            <a:pPr lvl="4"/>
-            <a:r>
-              <a:rPr lang="en-US" dirty="0"/>
-              <a:t>Bullet 3</a:t>
-            </a:r>
-          </a:p>
-        </p:txBody>
-      </p:sp>
+      <mc:AlternateContent xmlns:mc="http://schemas.openxmlformats.org/markup-compatibility/2006">
+        <mc:Choice xmlns:a14="http://schemas.microsoft.com/office/drawing/2010/main" Requires="a14">
+          <p:sp>
+            <p:nvSpPr>
+              <p:cNvPr id="4" name="Text Placeholder 3"/>
+              <p:cNvSpPr>
+                <a:spLocks noGrp="1"/>
+              </p:cNvSpPr>
+              <p:nvPr>
+                <p:ph type="body" sz="quarter" idx="14"/>
+              </p:nvPr>
+            </p:nvSpPr>
+            <p:spPr>
+              <a:xfrm>
+                <a:off x="246137" y="1158876"/>
+                <a:ext cx="8674026" cy="4368036"/>
+              </a:xfrm>
+            </p:spPr>
+            <p:txBody>
+              <a:bodyPr/>
+              <a:lstStyle/>
+              <a:p>
+                <a:r>
+                  <a:rPr lang="en-US" dirty="0"/>
+                  <a:t>How can the Ubox approach help us to correctly solve a pendulum (Properly!)?</a:t>
+                </a:r>
+              </a:p>
+              <a:p>
+                <a:pPr lvl="2"/>
+                <a:r>
+                  <a:rPr lang="en-US" dirty="0"/>
+                  <a:t>We don’t use Harmonic Oscillator solution: </a:t>
+                </a:r>
+                <a14:m>
+                  <m:oMath xmlns:m="http://schemas.openxmlformats.org/officeDocument/2006/math">
+                    <m:func>
+                      <m:funcPr>
+                        <m:ctrlPr>
+                          <a:rPr lang="en-AU" b="0" i="1" smtClean="0">
+                            <a:latin typeface="Cambria Math" panose="02040503050406030204" pitchFamily="18" charset="0"/>
+                          </a:rPr>
+                        </m:ctrlPr>
+                      </m:funcPr>
+                      <m:fName>
+                        <m:r>
+                          <m:rPr>
+                            <m:sty m:val="p"/>
+                          </m:rPr>
+                          <a:rPr lang="en-AU" b="0" i="0" smtClean="0">
+                            <a:latin typeface="Cambria Math" panose="02040503050406030204" pitchFamily="18" charset="0"/>
+                          </a:rPr>
+                          <m:t>sin</m:t>
+                        </m:r>
+                      </m:fName>
+                      <m:e>
+                        <m:d>
+                          <m:dPr>
+                            <m:ctrlPr>
+                              <a:rPr lang="en-AU" b="0" i="1" smtClean="0">
+                                <a:latin typeface="Cambria Math" panose="02040503050406030204" pitchFamily="18" charset="0"/>
+                              </a:rPr>
+                            </m:ctrlPr>
+                          </m:dPr>
+                          <m:e>
+                            <m:r>
+                              <a:rPr lang="en-AU" b="0" i="1" smtClean="0">
+                                <a:latin typeface="Cambria Math" panose="02040503050406030204" pitchFamily="18" charset="0"/>
+                              </a:rPr>
+                              <m:t>𝑥</m:t>
+                            </m:r>
+                          </m:e>
+                        </m:d>
+                      </m:e>
+                    </m:func>
+                    <m:r>
+                      <a:rPr lang="en-AU" b="0" i="1" smtClean="0">
+                        <a:latin typeface="Cambria Math" panose="02040503050406030204" pitchFamily="18" charset="0"/>
+                      </a:rPr>
+                      <m:t>=</m:t>
+                    </m:r>
+                    <m:r>
+                      <a:rPr lang="en-AU" b="0" i="1" smtClean="0">
+                        <a:latin typeface="Cambria Math" panose="02040503050406030204" pitchFamily="18" charset="0"/>
+                      </a:rPr>
+                      <m:t>𝑥</m:t>
+                    </m:r>
+                  </m:oMath>
+                </a14:m>
+                <a:endParaRPr lang="en-US" dirty="0"/>
+              </a:p>
+              <a:p>
+                <a:pPr lvl="2"/>
+                <a:r>
+                  <a:rPr lang="en-US" dirty="0"/>
+                  <a:t>The ‘usual’ numerical approach is to use time steps (no error bounds, no parallelism, sampling errors and rounding errors are likely to occur)</a:t>
+                </a:r>
+              </a:p>
+              <a:p>
+                <a:pPr lvl="2"/>
+                <a:r>
+                  <a:rPr lang="en-US" dirty="0"/>
+                  <a:t>Ubox method solves the problem by requiring that the solution curve obeys Physics (conservation of Energy, continuity, no instantaneous velocity changes) </a:t>
+                </a:r>
+              </a:p>
+              <a:p>
+                <a:pPr lvl="2"/>
+                <a:r>
+                  <a:rPr lang="en-US" dirty="0"/>
+                  <a:t>Ubox method allows for complete parallelism, no sampling or rounding errors, reports error bounds</a:t>
+                </a:r>
+              </a:p>
+            </p:txBody>
+          </p:sp>
+        </mc:Choice>
+        <mc:Fallback>
+          <p:sp>
+            <p:nvSpPr>
+              <p:cNvPr id="4" name="Text Placeholder 3"/>
+              <p:cNvSpPr>
+                <a:spLocks noGrp="1" noRot="1" noChangeAspect="1" noMove="1" noResize="1" noEditPoints="1" noAdjustHandles="1" noChangeArrowheads="1" noChangeShapeType="1" noTextEdit="1"/>
+              </p:cNvSpPr>
+              <p:nvPr>
+                <p:ph type="body" sz="quarter" idx="14"/>
+              </p:nvPr>
+            </p:nvSpPr>
+            <p:spPr>
+              <a:xfrm>
+                <a:off x="246137" y="1158876"/>
+                <a:ext cx="8674026" cy="4368036"/>
+              </a:xfrm>
+              <a:blipFill>
+                <a:blip r:embed="rId2"/>
+                <a:stretch>
+                  <a:fillRect l="-1405" t="-1395" r="-1616" b="-279"/>
+                </a:stretch>
+              </a:blipFill>
+            </p:spPr>
+            <p:txBody>
+              <a:bodyPr/>
+              <a:lstStyle/>
+              <a:p>
+                <a:r>
+                  <a:rPr lang="en-AU">
+                    <a:noFill/>
+                  </a:rPr>
+                  <a:t> </a:t>
+                </a:r>
+              </a:p>
+            </p:txBody>
+          </p:sp>
+        </mc:Fallback>
+      </mc:AlternateContent>
     </p:spTree>
     <p:extLst>
       <p:ext uri="{BB962C8B-B14F-4D97-AF65-F5344CB8AC3E}">
-        <p14:creationId xmlns:p14="http://schemas.microsoft.com/office/powerpoint/2010/main" val="1379029749"/>
+        <p14:creationId xmlns:p14="http://schemas.microsoft.com/office/powerpoint/2010/main" val="905699513"/>
       </p:ext>
     </p:extLst>
   </p:cSld>
@@ -2769,9 +2988,16 @@
             <p:ph type="body" sz="quarter" idx="14"/>
           </p:nvPr>
         </p:nvSpPr>
-        <p:spPr/>
-        <p:txBody>
-          <a:bodyPr/>
+        <p:spPr>
+          <a:xfrm>
+            <a:off x="246137" y="1158875"/>
+            <a:ext cx="8674026" cy="2863327"/>
+          </a:xfrm>
+        </p:spPr>
+        <p:txBody>
+          <a:bodyPr>
+            <a:normAutofit/>
+          </a:bodyPr>
           <a:lstStyle/>
           <a:p>
             <a:r>
@@ -2783,8 +3009,34 @@
             <a:pPr lvl="2"/>
             <a:r>
               <a:rPr lang="en-US" dirty="0"/>
-              <a:t>Currently the only way to implement Unums</a:t>
-            </a:r>
+              <a:t>Currently the only way to use Unums is through software implementations (Python, Julia, Mathematica)</a:t>
+            </a:r>
+          </a:p>
+          <a:p>
+            <a:pPr lvl="2"/>
+            <a:r>
+              <a:rPr lang="en-US" dirty="0"/>
+              <a:t>Software implementations are VERY SLOW </a:t>
+            </a:r>
+          </a:p>
+          <a:p>
+            <a:pPr lvl="2"/>
+            <a:r>
+              <a:rPr lang="en-US" dirty="0"/>
+              <a:t>Only way to effectively use </a:t>
+            </a:r>
+            <a:r>
+              <a:rPr lang="en-US" dirty="0" err="1"/>
+              <a:t>unums</a:t>
+            </a:r>
+            <a:r>
+              <a:rPr lang="en-US" dirty="0"/>
+              <a:t> is through a hardware implementation</a:t>
+            </a:r>
+          </a:p>
+          <a:p>
+            <a:pPr lvl="2"/>
+            <a:endParaRPr lang="en-US" dirty="0"/>
           </a:p>
         </p:txBody>
       </p:sp>
@@ -2864,8 +3116,8 @@
           </a:p>
         </p:txBody>
       </p:sp>
-      <mc:AlternateContent xmlns:mc="http://schemas.openxmlformats.org/markup-compatibility/2006">
-        <mc:Choice xmlns:a14="http://schemas.microsoft.com/office/drawing/2010/main" Requires="a14">
+      <mc:AlternateContent xmlns:mc="http://schemas.openxmlformats.org/markup-compatibility/2006" xmlns:a14="http://schemas.microsoft.com/office/drawing/2010/main">
+        <mc:Choice Requires="a14">
           <p:sp>
             <p:nvSpPr>
               <p:cNvPr id="4" name="Text Placeholder 3"/>
@@ -3012,7 +3264,7 @@
                 <a:pPr lvl="2"/>
                 <a:r>
                   <a:rPr lang="en-US" dirty="0"/>
-                  <a:t>Fixed size representations of floats (16bit, 32bit, 96bit, 128bit etc.)</a:t>
+                  <a:t>Fixed size storage of floats (16bit, 32bit, 64bit,128bit)</a:t>
                 </a:r>
               </a:p>
               <a:p>
@@ -3025,7 +3277,7 @@
             </p:txBody>
           </p:sp>
         </mc:Choice>
-        <mc:Fallback>
+        <mc:Fallback xmlns="">
           <p:sp>
             <p:nvSpPr>
               <p:cNvPr id="4" name="Text Placeholder 3"/>
@@ -3042,9 +3294,9 @@
                 <a:ext cx="5031918" cy="5211763"/>
               </a:xfrm>
               <a:blipFill>
-                <a:blip r:embed="rId2"/>
+                <a:blip r:embed="rId5"/>
                 <a:stretch>
-                  <a:fillRect l="-2421" t="-1170" r="-1937"/>
+                  <a:fillRect l="-2421" t="-1170" r="-969"/>
                 </a:stretch>
               </a:blipFill>
             </p:spPr>
@@ -3072,7 +3324,7 @@
           <p:nvPr/>
         </p:nvPicPr>
         <p:blipFill>
-          <a:blip r:embed="rId3"/>
+          <a:blip r:embed="rId6"/>
           <a:stretch>
             <a:fillRect/>
           </a:stretch>
@@ -3096,7 +3348,7 @@
           <p:nvPr/>
         </p:nvPicPr>
         <p:blipFill>
-          <a:blip r:embed="rId4"/>
+          <a:blip r:embed="rId7"/>
           <a:stretch>
             <a:fillRect/>
           </a:stretch>
@@ -3105,6 +3357,30 @@
           <a:xfrm>
             <a:off x="5558028" y="3611301"/>
             <a:ext cx="3177258" cy="2676282"/>
+          </a:xfrm>
+          <a:prstGeom prst="rect">
+            <a:avLst/>
+          </a:prstGeom>
+        </p:spPr>
+      </p:pic>
+      <p:pic>
+        <p:nvPicPr>
+          <p:cNvPr id="9" name="Picture 8"/>
+          <p:cNvPicPr>
+            <a:picLocks noChangeAspect="1"/>
+          </p:cNvPicPr>
+          <p:nvPr/>
+        </p:nvPicPr>
+        <p:blipFill>
+          <a:blip r:embed="rId8"/>
+          <a:stretch>
+            <a:fillRect/>
+          </a:stretch>
+        </p:blipFill>
+        <p:spPr>
+          <a:xfrm>
+            <a:off x="716272" y="4784656"/>
+            <a:ext cx="3871732" cy="1765389"/>
           </a:xfrm>
           <a:prstGeom prst="rect">
             <a:avLst/>
@@ -3199,43 +3475,715 @@
         </p:nvSpPr>
         <p:spPr>
           <a:xfrm>
-            <a:off x="246137" y="1158876"/>
-            <a:ext cx="8608496" cy="2539235"/>
+            <a:off x="246136" y="1158876"/>
+            <a:ext cx="8620071" cy="2469787"/>
           </a:xfrm>
         </p:spPr>
         <p:txBody>
+          <a:bodyPr>
+            <a:normAutofit/>
+          </a:bodyPr>
+          <a:lstStyle/>
+          <a:p>
+            <a:r>
+              <a:rPr lang="en-AU" dirty="0"/>
+              <a:t>The Unums form a SUPERSET of the IEEE floats and attempt to resolve many of their issues:</a:t>
+            </a:r>
+            <a:endParaRPr lang="en-US" dirty="0"/>
+          </a:p>
+          <a:p>
+            <a:pPr lvl="2"/>
+            <a:r>
+              <a:rPr lang="en-US" dirty="0"/>
+              <a:t>Resolve Rounding Errors using Open Intervals</a:t>
+            </a:r>
+          </a:p>
+          <a:p>
+            <a:pPr lvl="2"/>
+            <a:r>
+              <a:rPr lang="en-US" dirty="0"/>
+              <a:t>Resolution of Rounding Errors gives us associativity</a:t>
+            </a:r>
+          </a:p>
+          <a:p>
+            <a:pPr lvl="2"/>
+            <a:r>
+              <a:rPr lang="en-US" dirty="0"/>
+              <a:t>Variable Size Storage allow us to reduce power costs and increase speed of computations</a:t>
+            </a:r>
+          </a:p>
+          <a:p>
+            <a:endParaRPr lang="en-AU" dirty="0"/>
+          </a:p>
+        </p:txBody>
+      </p:sp>
+      <p:sp>
+        <p:nvSpPr>
+          <p:cNvPr id="8" name="TextBox 7"/>
+          <p:cNvSpPr txBox="1"/>
+          <p:nvPr/>
+        </p:nvSpPr>
+        <p:spPr>
+          <a:xfrm>
+            <a:off x="6655443" y="4259484"/>
+            <a:ext cx="1812917" cy="369332"/>
+          </a:xfrm>
+          <a:prstGeom prst="rect">
+            <a:avLst/>
+          </a:prstGeom>
+          <a:noFill/>
+        </p:spPr>
+        <p:txBody>
+          <a:bodyPr wrap="square" rtlCol="0">
+            <a:spAutoFit/>
+          </a:bodyPr>
+          <a:lstStyle/>
+          <a:p>
+            <a:endParaRPr lang="en-AU" dirty="0">
+              <a:solidFill>
+                <a:srgbClr val="FF0000"/>
+              </a:solidFill>
+            </a:endParaRPr>
+          </a:p>
+        </p:txBody>
+      </p:sp>
+      <p:pic>
+        <p:nvPicPr>
+          <p:cNvPr id="10" name="Picture 9"/>
+          <p:cNvPicPr>
+            <a:picLocks noChangeAspect="1"/>
+          </p:cNvPicPr>
+          <p:nvPr/>
+        </p:nvPicPr>
+        <p:blipFill>
+          <a:blip r:embed="rId2"/>
+          <a:stretch>
+            <a:fillRect/>
+          </a:stretch>
+        </p:blipFill>
+        <p:spPr>
+          <a:xfrm>
+            <a:off x="1410751" y="4012731"/>
+            <a:ext cx="6290840" cy="1588437"/>
+          </a:xfrm>
+          <a:prstGeom prst="rect">
+            <a:avLst/>
+          </a:prstGeom>
+        </p:spPr>
+      </p:pic>
+    </p:spTree>
+    <p:extLst>
+      <p:ext uri="{BB962C8B-B14F-4D97-AF65-F5344CB8AC3E}">
+        <p14:creationId xmlns:p14="http://schemas.microsoft.com/office/powerpoint/2010/main" val="3624083412"/>
+      </p:ext>
+    </p:extLst>
+  </p:cSld>
+  <p:clrMapOvr>
+    <a:masterClrMapping/>
+  </p:clrMapOvr>
+</p:sld>
+</file>
+
+<file path=ppt/slides/slide4.xml><?xml version="1.0" encoding="utf-8"?>
+<p:sld xmlns:a="http://schemas.openxmlformats.org/drawingml/2006/main" xmlns:r="http://schemas.openxmlformats.org/officeDocument/2006/relationships" xmlns:p="http://schemas.openxmlformats.org/presentationml/2006/main">
+  <p:cSld>
+    <p:spTree>
+      <p:nvGrpSpPr>
+        <p:cNvPr id="1" name=""/>
+        <p:cNvGrpSpPr/>
+        <p:nvPr/>
+      </p:nvGrpSpPr>
+      <p:grpSpPr>
+        <a:xfrm>
+          <a:off x="0" y="0"/>
+          <a:ext cx="0" cy="0"/>
+          <a:chOff x="0" y="0"/>
+          <a:chExt cx="0" cy="0"/>
+        </a:xfrm>
+      </p:grpSpPr>
+      <p:sp>
+        <p:nvSpPr>
+          <p:cNvPr id="2" name="Title 1"/>
+          <p:cNvSpPr>
+            <a:spLocks noGrp="1"/>
+          </p:cNvSpPr>
+          <p:nvPr>
+            <p:ph type="title"/>
+          </p:nvPr>
+        </p:nvSpPr>
+        <p:spPr>
+          <a:xfrm>
+            <a:off x="2071869" y="132080"/>
+            <a:ext cx="5758405" cy="650240"/>
+          </a:xfrm>
+        </p:spPr>
+        <p:txBody>
+          <a:bodyPr>
+            <a:normAutofit fontScale="90000"/>
+          </a:bodyPr>
+          <a:lstStyle/>
+          <a:p>
+            <a:r>
+              <a:rPr lang="en-US" dirty="0"/>
+              <a:t>Rounding &amp; Associativity</a:t>
+            </a:r>
+          </a:p>
+        </p:txBody>
+      </p:sp>
+      <p:sp>
+        <p:nvSpPr>
+          <p:cNvPr id="3" name="Footer Placeholder 2"/>
+          <p:cNvSpPr>
+            <a:spLocks noGrp="1"/>
+          </p:cNvSpPr>
+          <p:nvPr>
+            <p:ph type="ftr" sz="quarter" idx="10"/>
+          </p:nvPr>
+        </p:nvSpPr>
+        <p:spPr/>
+        <p:txBody>
           <a:bodyPr/>
           <a:lstStyle/>
           <a:p>
             <a:r>
-              <a:rPr lang="en-AU" dirty="0"/>
-              <a:t>The Unums form a SUPERSET of the IEEE floats and attempt to resolve many of their issues:</a:t>
-            </a:r>
+              <a:rPr lang="en-US" dirty="0"/>
+              <a:t>Digital Noise, Accuracy &amp; Precision</a:t>
+            </a:r>
+          </a:p>
+        </p:txBody>
+      </p:sp>
+      <p:sp>
+        <p:nvSpPr>
+          <p:cNvPr id="4" name="Text Placeholder 3"/>
+          <p:cNvSpPr>
+            <a:spLocks noGrp="1"/>
+          </p:cNvSpPr>
+          <p:nvPr>
+            <p:ph type="body" sz="quarter" idx="14"/>
+          </p:nvPr>
+        </p:nvSpPr>
+        <p:spPr>
+          <a:xfrm>
+            <a:off x="246137" y="1158875"/>
+            <a:ext cx="4516845" cy="5211763"/>
+          </a:xfrm>
+        </p:spPr>
+        <p:txBody>
+          <a:bodyPr>
+            <a:normAutofit/>
+          </a:bodyPr>
+          <a:lstStyle/>
+          <a:p>
+            <a:r>
+              <a:rPr lang="en-US" dirty="0"/>
+              <a:t>How are these related?</a:t>
+            </a:r>
+          </a:p>
+        </p:txBody>
+      </p:sp>
+    </p:spTree>
+    <p:extLst>
+      <p:ext uri="{BB962C8B-B14F-4D97-AF65-F5344CB8AC3E}">
+        <p14:creationId xmlns:p14="http://schemas.microsoft.com/office/powerpoint/2010/main" val="535885377"/>
+      </p:ext>
+    </p:extLst>
+  </p:cSld>
+  <p:clrMapOvr>
+    <a:masterClrMapping/>
+  </p:clrMapOvr>
+</p:sld>
+</file>
+
+<file path=ppt/slides/slide5.xml><?xml version="1.0" encoding="utf-8"?>
+<p:sld xmlns:a="http://schemas.openxmlformats.org/drawingml/2006/main" xmlns:r="http://schemas.openxmlformats.org/officeDocument/2006/relationships" xmlns:p="http://schemas.openxmlformats.org/presentationml/2006/main">
+  <p:cSld>
+    <p:spTree>
+      <p:nvGrpSpPr>
+        <p:cNvPr id="1" name=""/>
+        <p:cNvGrpSpPr/>
+        <p:nvPr/>
+      </p:nvGrpSpPr>
+      <p:grpSpPr>
+        <a:xfrm>
+          <a:off x="0" y="0"/>
+          <a:ext cx="0" cy="0"/>
+          <a:chOff x="0" y="0"/>
+          <a:chExt cx="0" cy="0"/>
+        </a:xfrm>
+      </p:grpSpPr>
+      <p:sp>
+        <p:nvSpPr>
+          <p:cNvPr id="2" name="Title 1"/>
+          <p:cNvSpPr>
+            <a:spLocks noGrp="1"/>
+          </p:cNvSpPr>
+          <p:nvPr>
+            <p:ph type="title"/>
+          </p:nvPr>
+        </p:nvSpPr>
+        <p:spPr/>
+        <p:txBody>
+          <a:bodyPr>
+            <a:normAutofit fontScale="90000"/>
+          </a:bodyPr>
+          <a:lstStyle/>
+          <a:p>
+            <a:r>
+              <a:rPr lang="en-US" dirty="0"/>
+              <a:t>The Impact of Rounding Errors </a:t>
+            </a:r>
+          </a:p>
+        </p:txBody>
+      </p:sp>
+      <p:sp>
+        <p:nvSpPr>
+          <p:cNvPr id="3" name="Footer Placeholder 2"/>
+          <p:cNvSpPr>
+            <a:spLocks noGrp="1"/>
+          </p:cNvSpPr>
+          <p:nvPr>
+            <p:ph type="ftr" sz="quarter" idx="10"/>
+          </p:nvPr>
+        </p:nvSpPr>
+        <p:spPr/>
+        <p:txBody>
+          <a:bodyPr/>
+          <a:lstStyle/>
+          <a:p>
+            <a:r>
+              <a:rPr lang="en-US" dirty="0"/>
+              <a:t>Digital Noise, Accuracy &amp; Precision</a:t>
+            </a:r>
+          </a:p>
+        </p:txBody>
+      </p:sp>
+      <p:sp>
+        <p:nvSpPr>
+          <p:cNvPr id="4" name="Text Placeholder 3"/>
+          <p:cNvSpPr>
+            <a:spLocks noGrp="1"/>
+          </p:cNvSpPr>
+          <p:nvPr>
+            <p:ph type="body" sz="quarter" idx="14"/>
+          </p:nvPr>
+        </p:nvSpPr>
+        <p:spPr/>
+        <p:txBody>
+          <a:bodyPr/>
+          <a:lstStyle/>
+          <a:p>
+            <a:r>
+              <a:rPr lang="en-US" dirty="0"/>
+              <a:t>Heading</a:t>
+            </a:r>
+          </a:p>
+          <a:p>
+            <a:pPr lvl="1"/>
+            <a:r>
+              <a:rPr lang="en-US" dirty="0"/>
+              <a:t>Text</a:t>
+            </a:r>
+          </a:p>
+          <a:p>
+            <a:pPr lvl="2"/>
+            <a:r>
+              <a:rPr lang="en-US" dirty="0"/>
+              <a:t>Bullet 1</a:t>
+            </a:r>
+          </a:p>
+          <a:p>
+            <a:pPr lvl="3"/>
+            <a:r>
+              <a:rPr lang="en-US" dirty="0"/>
+              <a:t>Bullet 2</a:t>
+            </a:r>
+          </a:p>
+          <a:p>
+            <a:pPr lvl="4"/>
+            <a:r>
+              <a:rPr lang="en-US" dirty="0"/>
+              <a:t>Bullet 3</a:t>
+            </a:r>
+          </a:p>
+        </p:txBody>
+      </p:sp>
+    </p:spTree>
+    <p:extLst>
+      <p:ext uri="{BB962C8B-B14F-4D97-AF65-F5344CB8AC3E}">
+        <p14:creationId xmlns:p14="http://schemas.microsoft.com/office/powerpoint/2010/main" val="1873256951"/>
+      </p:ext>
+    </p:extLst>
+  </p:cSld>
+  <p:clrMapOvr>
+    <a:masterClrMapping/>
+  </p:clrMapOvr>
+</p:sld>
+</file>
+
+<file path=ppt/slides/slide6.xml><?xml version="1.0" encoding="utf-8"?>
+<p:sld xmlns:a="http://schemas.openxmlformats.org/drawingml/2006/main" xmlns:r="http://schemas.openxmlformats.org/officeDocument/2006/relationships" xmlns:p="http://schemas.openxmlformats.org/presentationml/2006/main">
+  <p:cSld>
+    <p:spTree>
+      <p:nvGrpSpPr>
+        <p:cNvPr id="1" name=""/>
+        <p:cNvGrpSpPr/>
+        <p:nvPr/>
+      </p:nvGrpSpPr>
+      <p:grpSpPr>
+        <a:xfrm>
+          <a:off x="0" y="0"/>
+          <a:ext cx="0" cy="0"/>
+          <a:chOff x="0" y="0"/>
+          <a:chExt cx="0" cy="0"/>
+        </a:xfrm>
+      </p:grpSpPr>
+      <p:sp>
+        <p:nvSpPr>
+          <p:cNvPr id="2" name="Title 1"/>
+          <p:cNvSpPr>
+            <a:spLocks noGrp="1"/>
+          </p:cNvSpPr>
+          <p:nvPr>
+            <p:ph type="title"/>
+          </p:nvPr>
+        </p:nvSpPr>
+        <p:spPr>
+          <a:xfrm>
+            <a:off x="2054120" y="131051"/>
+            <a:ext cx="5845601" cy="650240"/>
+          </a:xfrm>
+        </p:spPr>
+        <p:txBody>
+          <a:bodyPr>
+            <a:normAutofit fontScale="90000"/>
+          </a:bodyPr>
+          <a:lstStyle/>
+          <a:p>
+            <a:r>
+              <a:rPr lang="en-US" dirty="0"/>
+              <a:t>The Patriot Missile Issue</a:t>
+            </a:r>
+          </a:p>
+        </p:txBody>
+      </p:sp>
+      <p:sp>
+        <p:nvSpPr>
+          <p:cNvPr id="3" name="Footer Placeholder 2"/>
+          <p:cNvSpPr>
+            <a:spLocks noGrp="1"/>
+          </p:cNvSpPr>
+          <p:nvPr>
+            <p:ph type="ftr" sz="quarter" idx="10"/>
+          </p:nvPr>
+        </p:nvSpPr>
+        <p:spPr/>
+        <p:txBody>
+          <a:bodyPr/>
+          <a:lstStyle/>
+          <a:p>
+            <a:r>
+              <a:rPr lang="en-US" dirty="0"/>
+              <a:t>Digital Noise, Accuracy &amp; Precision</a:t>
+            </a:r>
+          </a:p>
+        </p:txBody>
+      </p:sp>
+      <p:sp>
+        <p:nvSpPr>
+          <p:cNvPr id="4" name="Text Placeholder 3"/>
+          <p:cNvSpPr>
+            <a:spLocks noGrp="1"/>
+          </p:cNvSpPr>
+          <p:nvPr>
+            <p:ph type="body" sz="quarter" idx="14"/>
+          </p:nvPr>
+        </p:nvSpPr>
+        <p:spPr/>
+        <p:txBody>
+          <a:bodyPr/>
+          <a:lstStyle/>
+          <a:p>
+            <a:r>
+              <a:rPr lang="en-US" dirty="0"/>
+              <a:t>Heading</a:t>
+            </a:r>
+          </a:p>
+          <a:p>
+            <a:pPr lvl="1"/>
+            <a:r>
+              <a:rPr lang="en-US" dirty="0"/>
+              <a:t>Text</a:t>
+            </a:r>
+          </a:p>
+          <a:p>
+            <a:pPr lvl="2"/>
+            <a:r>
+              <a:rPr lang="en-US" dirty="0"/>
+              <a:t>Bullet 1</a:t>
+            </a:r>
+          </a:p>
+          <a:p>
+            <a:pPr lvl="3"/>
+            <a:r>
+              <a:rPr lang="en-US" dirty="0"/>
+              <a:t>Bullet 2</a:t>
+            </a:r>
+          </a:p>
+          <a:p>
+            <a:pPr lvl="4"/>
+            <a:r>
+              <a:rPr lang="en-US" dirty="0"/>
+              <a:t>Bullet 3</a:t>
+            </a:r>
+          </a:p>
+        </p:txBody>
+      </p:sp>
+    </p:spTree>
+    <p:extLst>
+      <p:ext uri="{BB962C8B-B14F-4D97-AF65-F5344CB8AC3E}">
+        <p14:creationId xmlns:p14="http://schemas.microsoft.com/office/powerpoint/2010/main" val="1836954211"/>
+      </p:ext>
+    </p:extLst>
+  </p:cSld>
+  <p:clrMapOvr>
+    <a:masterClrMapping/>
+  </p:clrMapOvr>
+</p:sld>
+</file>
+
+<file path=ppt/slides/slide7.xml><?xml version="1.0" encoding="utf-8"?>
+<p:sld xmlns:a="http://schemas.openxmlformats.org/drawingml/2006/main" xmlns:r="http://schemas.openxmlformats.org/officeDocument/2006/relationships" xmlns:p="http://schemas.openxmlformats.org/presentationml/2006/main">
+  <p:cSld>
+    <p:spTree>
+      <p:nvGrpSpPr>
+        <p:cNvPr id="1" name=""/>
+        <p:cNvGrpSpPr/>
+        <p:nvPr/>
+      </p:nvGrpSpPr>
+      <p:grpSpPr>
+        <a:xfrm>
+          <a:off x="0" y="0"/>
+          <a:ext cx="0" cy="0"/>
+          <a:chOff x="0" y="0"/>
+          <a:chExt cx="0" cy="0"/>
+        </a:xfrm>
+      </p:grpSpPr>
+      <p:sp>
+        <p:nvSpPr>
+          <p:cNvPr id="2" name="Title 1"/>
+          <p:cNvSpPr>
+            <a:spLocks noGrp="1"/>
+          </p:cNvSpPr>
+          <p:nvPr>
+            <p:ph type="title"/>
+          </p:nvPr>
+        </p:nvSpPr>
+        <p:spPr>
+          <a:xfrm>
+            <a:off x="1765140" y="132080"/>
+            <a:ext cx="6487610" cy="650240"/>
+          </a:xfrm>
+        </p:spPr>
+        <p:txBody>
+          <a:bodyPr>
+            <a:normAutofit fontScale="90000"/>
+          </a:bodyPr>
+          <a:lstStyle/>
+          <a:p>
+            <a:r>
+              <a:rPr lang="en-US" dirty="0"/>
+              <a:t>Fixed Size Storage in IEEE</a:t>
+            </a:r>
+          </a:p>
+        </p:txBody>
+      </p:sp>
+      <p:sp>
+        <p:nvSpPr>
+          <p:cNvPr id="3" name="Footer Placeholder 2"/>
+          <p:cNvSpPr>
+            <a:spLocks noGrp="1"/>
+          </p:cNvSpPr>
+          <p:nvPr>
+            <p:ph type="ftr" sz="quarter" idx="10"/>
+          </p:nvPr>
+        </p:nvSpPr>
+        <p:spPr/>
+        <p:txBody>
+          <a:bodyPr/>
+          <a:lstStyle/>
+          <a:p>
+            <a:r>
+              <a:rPr lang="en-US" dirty="0"/>
+              <a:t>Digital Noise, Accuracy &amp; Precision</a:t>
+            </a:r>
+          </a:p>
+        </p:txBody>
+      </p:sp>
+      <p:sp>
+        <p:nvSpPr>
+          <p:cNvPr id="4" name="Text Placeholder 3"/>
+          <p:cNvSpPr>
+            <a:spLocks noGrp="1"/>
+          </p:cNvSpPr>
+          <p:nvPr>
+            <p:ph type="body" sz="quarter" idx="14"/>
+          </p:nvPr>
+        </p:nvSpPr>
+        <p:spPr>
+          <a:xfrm>
+            <a:off x="246137" y="1158876"/>
+            <a:ext cx="8674026" cy="3540446"/>
+          </a:xfrm>
+        </p:spPr>
+        <p:txBody>
+          <a:bodyPr>
+            <a:normAutofit/>
+          </a:bodyPr>
+          <a:lstStyle/>
+          <a:p>
+            <a:r>
+              <a:rPr lang="en-US" dirty="0"/>
+              <a:t>The IEEE standard defines 4 presets for floats</a:t>
+            </a:r>
+          </a:p>
+          <a:p>
+            <a:pPr lvl="2"/>
+            <a:r>
+              <a:rPr lang="en-US" dirty="0"/>
+              <a:t>The IEEE standard prescribes our 16, 32, 64 and 128 bit presets with fixed allocations of exponent and fraction bits</a:t>
+            </a:r>
+          </a:p>
+          <a:p>
+            <a:pPr lvl="2"/>
+            <a:r>
+              <a:rPr lang="en-US" dirty="0"/>
+              <a:t>There is no “correct” allocation for exponent and fraction bits (chosen by a committee – exponent bits are cheaper so more were added than usually needed)</a:t>
+            </a:r>
+          </a:p>
+          <a:p>
+            <a:pPr lvl="2"/>
+            <a:r>
+              <a:rPr lang="en-US" dirty="0"/>
+              <a:t>It isn’t always trivial to know the “correct” float size – too small and you get garbage (possibly without knowing), too large and you waste bits, power and speed</a:t>
+            </a:r>
+          </a:p>
+          <a:p>
+            <a:pPr lvl="2"/>
             <a:endParaRPr lang="en-US" dirty="0"/>
           </a:p>
           <a:p>
             <a:pPr lvl="2"/>
-            <a:r>
-              <a:rPr lang="en-US" dirty="0"/>
-              <a:t>Resolve Rounding Errors using Open Intervals</a:t>
+            <a:endParaRPr lang="en-US" dirty="0"/>
+          </a:p>
+        </p:txBody>
+      </p:sp>
+    </p:spTree>
+    <p:extLst>
+      <p:ext uri="{BB962C8B-B14F-4D97-AF65-F5344CB8AC3E}">
+        <p14:creationId xmlns:p14="http://schemas.microsoft.com/office/powerpoint/2010/main" val="2057417950"/>
+      </p:ext>
+    </p:extLst>
+  </p:cSld>
+  <p:clrMapOvr>
+    <a:masterClrMapping/>
+  </p:clrMapOvr>
+</p:sld>
+</file>
+
+<file path=ppt/slides/slide8.xml><?xml version="1.0" encoding="utf-8"?>
+<p:sld xmlns:a="http://schemas.openxmlformats.org/drawingml/2006/main" xmlns:r="http://schemas.openxmlformats.org/officeDocument/2006/relationships" xmlns:p="http://schemas.openxmlformats.org/presentationml/2006/main">
+  <p:cSld>
+    <p:spTree>
+      <p:nvGrpSpPr>
+        <p:cNvPr id="1" name=""/>
+        <p:cNvGrpSpPr/>
+        <p:nvPr/>
+      </p:nvGrpSpPr>
+      <p:grpSpPr>
+        <a:xfrm>
+          <a:off x="0" y="0"/>
+          <a:ext cx="0" cy="0"/>
+          <a:chOff x="0" y="0"/>
+          <a:chExt cx="0" cy="0"/>
+        </a:xfrm>
+      </p:grpSpPr>
+      <p:sp>
+        <p:nvSpPr>
+          <p:cNvPr id="2" name="Title 1"/>
+          <p:cNvSpPr>
+            <a:spLocks noGrp="1"/>
+          </p:cNvSpPr>
+          <p:nvPr>
+            <p:ph type="title"/>
+          </p:nvPr>
+        </p:nvSpPr>
+        <p:spPr>
+          <a:xfrm>
+            <a:off x="1981547" y="142626"/>
+            <a:ext cx="5203206" cy="650240"/>
+          </a:xfrm>
+        </p:spPr>
+        <p:txBody>
+          <a:bodyPr>
+            <a:normAutofit fontScale="90000"/>
+          </a:bodyPr>
+          <a:lstStyle/>
+          <a:p>
+            <a:r>
+              <a:rPr lang="en-US" dirty="0"/>
+              <a:t>Variable Size Storage</a:t>
+            </a:r>
+          </a:p>
+        </p:txBody>
+      </p:sp>
+      <p:sp>
+        <p:nvSpPr>
+          <p:cNvPr id="3" name="Footer Placeholder 2"/>
+          <p:cNvSpPr>
+            <a:spLocks noGrp="1"/>
+          </p:cNvSpPr>
+          <p:nvPr>
+            <p:ph type="ftr" sz="quarter" idx="10"/>
+          </p:nvPr>
+        </p:nvSpPr>
+        <p:spPr/>
+        <p:txBody>
+          <a:bodyPr/>
+          <a:lstStyle/>
+          <a:p>
+            <a:r>
+              <a:rPr lang="en-US" dirty="0"/>
+              <a:t>Digital Noise, Accuracy &amp; Precision</a:t>
+            </a:r>
+          </a:p>
+        </p:txBody>
+      </p:sp>
+      <p:sp>
+        <p:nvSpPr>
+          <p:cNvPr id="4" name="Text Placeholder 3"/>
+          <p:cNvSpPr>
+            <a:spLocks noGrp="1"/>
+          </p:cNvSpPr>
+          <p:nvPr>
+            <p:ph type="body" sz="quarter" idx="14"/>
+          </p:nvPr>
+        </p:nvSpPr>
+        <p:spPr/>
+        <p:txBody>
+          <a:bodyPr/>
+          <a:lstStyle/>
+          <a:p>
+            <a:r>
+              <a:rPr lang="en-US" dirty="0"/>
+              <a:t>Introducing dynamic bit length allows us to speed up computation and decrease power costs</a:t>
             </a:r>
           </a:p>
           <a:p>
             <a:pPr lvl="2"/>
             <a:r>
               <a:rPr lang="en-US" dirty="0"/>
-              <a:t>Resolution of Rounding Errors gives us associativity</a:t>
-            </a:r>
-          </a:p>
-          <a:p>
-            <a:pPr lvl="2"/>
-            <a:r>
-              <a:rPr lang="en-US" dirty="0"/>
-              <a:t>Variable Size Representations allow us to reduce power costs and increase speed of computations</a:t>
-            </a:r>
-          </a:p>
-          <a:p>
-            <a:endParaRPr lang="en-AU" dirty="0"/>
+              <a:t>Bullet 1</a:t>
+            </a:r>
           </a:p>
         </p:txBody>
       </p:sp>
@@ -3289,37 +4237,7 @@
       </p:pic>
       <p:sp>
         <p:nvSpPr>
-          <p:cNvPr id="8" name="TextBox 7"/>
-          <p:cNvSpPr txBox="1"/>
-          <p:nvPr/>
-        </p:nvSpPr>
-        <p:spPr>
-          <a:xfrm>
-            <a:off x="6655443" y="4259484"/>
-            <a:ext cx="1812917" cy="369332"/>
-          </a:xfrm>
-          <a:prstGeom prst="rect">
-            <a:avLst/>
-          </a:prstGeom>
-          <a:noFill/>
-        </p:spPr>
-        <p:txBody>
-          <a:bodyPr wrap="square" rtlCol="0">
-            <a:spAutoFit/>
-          </a:bodyPr>
-          <a:lstStyle/>
-          <a:p>
-            <a:endParaRPr lang="en-AU" dirty="0">
-              <a:solidFill>
-                <a:srgbClr val="FF0000"/>
-              </a:solidFill>
-            </a:endParaRPr>
-          </a:p>
-        </p:txBody>
-      </p:sp>
-      <p:sp>
-        <p:nvSpPr>
-          <p:cNvPr id="9" name="TextBox 8"/>
+          <p:cNvPr id="7" name="TextBox 6"/>
           <p:cNvSpPr txBox="1"/>
           <p:nvPr/>
         </p:nvSpPr>
@@ -3346,639 +4264,6 @@
                 </a:solidFill>
               </a:rPr>
               <a:t>Avogadro’s Number represented using a double precision float and the Unum {3,4} environment</a:t>
-            </a:r>
-          </a:p>
-        </p:txBody>
-      </p:sp>
-    </p:spTree>
-    <p:extLst>
-      <p:ext uri="{BB962C8B-B14F-4D97-AF65-F5344CB8AC3E}">
-        <p14:creationId xmlns:p14="http://schemas.microsoft.com/office/powerpoint/2010/main" val="3624083412"/>
-      </p:ext>
-    </p:extLst>
-  </p:cSld>
-  <p:clrMapOvr>
-    <a:masterClrMapping/>
-  </p:clrMapOvr>
-</p:sld>
-</file>
-
-<file path=ppt/slides/slide4.xml><?xml version="1.0" encoding="utf-8"?>
-<p:sld xmlns:a="http://schemas.openxmlformats.org/drawingml/2006/main" xmlns:r="http://schemas.openxmlformats.org/officeDocument/2006/relationships" xmlns:p="http://schemas.openxmlformats.org/presentationml/2006/main">
-  <p:cSld>
-    <p:spTree>
-      <p:nvGrpSpPr>
-        <p:cNvPr id="1" name=""/>
-        <p:cNvGrpSpPr/>
-        <p:nvPr/>
-      </p:nvGrpSpPr>
-      <p:grpSpPr>
-        <a:xfrm>
-          <a:off x="0" y="0"/>
-          <a:ext cx="0" cy="0"/>
-          <a:chOff x="0" y="0"/>
-          <a:chExt cx="0" cy="0"/>
-        </a:xfrm>
-      </p:grpSpPr>
-      <p:sp>
-        <p:nvSpPr>
-          <p:cNvPr id="2" name="Title 1"/>
-          <p:cNvSpPr>
-            <a:spLocks noGrp="1"/>
-          </p:cNvSpPr>
-          <p:nvPr>
-            <p:ph type="title"/>
-          </p:nvPr>
-        </p:nvSpPr>
-        <p:spPr>
-          <a:xfrm>
-            <a:off x="2071869" y="132080"/>
-            <a:ext cx="5758405" cy="650240"/>
-          </a:xfrm>
-        </p:spPr>
-        <p:txBody>
-          <a:bodyPr>
-            <a:normAutofit fontScale="90000"/>
-          </a:bodyPr>
-          <a:lstStyle/>
-          <a:p>
-            <a:r>
-              <a:rPr lang="en-US" dirty="0"/>
-              <a:t>Rounding &amp; Associativity</a:t>
-            </a:r>
-          </a:p>
-        </p:txBody>
-      </p:sp>
-      <p:sp>
-        <p:nvSpPr>
-          <p:cNvPr id="3" name="Footer Placeholder 2"/>
-          <p:cNvSpPr>
-            <a:spLocks noGrp="1"/>
-          </p:cNvSpPr>
-          <p:nvPr>
-            <p:ph type="ftr" sz="quarter" idx="10"/>
-          </p:nvPr>
-        </p:nvSpPr>
-        <p:spPr/>
-        <p:txBody>
-          <a:bodyPr/>
-          <a:lstStyle/>
-          <a:p>
-            <a:r>
-              <a:rPr lang="en-US" dirty="0"/>
-              <a:t>Digital Noise, Accuracy &amp; Precision</a:t>
-            </a:r>
-          </a:p>
-        </p:txBody>
-      </p:sp>
-      <p:sp>
-        <p:nvSpPr>
-          <p:cNvPr id="4" name="Text Placeholder 3"/>
-          <p:cNvSpPr>
-            <a:spLocks noGrp="1"/>
-          </p:cNvSpPr>
-          <p:nvPr>
-            <p:ph type="body" sz="quarter" idx="14"/>
-          </p:nvPr>
-        </p:nvSpPr>
-        <p:spPr>
-          <a:xfrm>
-            <a:off x="246137" y="1158875"/>
-            <a:ext cx="4516845" cy="5211763"/>
-          </a:xfrm>
-        </p:spPr>
-        <p:txBody>
-          <a:bodyPr>
-            <a:normAutofit/>
-          </a:bodyPr>
-          <a:lstStyle/>
-          <a:p>
-            <a:r>
-              <a:rPr lang="en-US" dirty="0"/>
-              <a:t>How are these related?</a:t>
-            </a:r>
-          </a:p>
-          <a:p>
-            <a:pPr lvl="2"/>
-            <a:r>
-              <a:rPr lang="en-US" dirty="0"/>
-              <a:t>In the IEEE’s if you attempt to store a number that lies between two floats then it must be rounded before being stored</a:t>
-            </a:r>
-          </a:p>
-          <a:p>
-            <a:pPr lvl="2"/>
-            <a:r>
-              <a:rPr lang="en-US" dirty="0"/>
-              <a:t>Unums </a:t>
-            </a:r>
-          </a:p>
-        </p:txBody>
-      </p:sp>
-    </p:spTree>
-    <p:extLst>
-      <p:ext uri="{BB962C8B-B14F-4D97-AF65-F5344CB8AC3E}">
-        <p14:creationId xmlns:p14="http://schemas.microsoft.com/office/powerpoint/2010/main" val="535885377"/>
-      </p:ext>
-    </p:extLst>
-  </p:cSld>
-  <p:clrMapOvr>
-    <a:masterClrMapping/>
-  </p:clrMapOvr>
-</p:sld>
-</file>
-
-<file path=ppt/slides/slide5.xml><?xml version="1.0" encoding="utf-8"?>
-<p:sld xmlns:a="http://schemas.openxmlformats.org/drawingml/2006/main" xmlns:r="http://schemas.openxmlformats.org/officeDocument/2006/relationships" xmlns:p="http://schemas.openxmlformats.org/presentationml/2006/main">
-  <p:cSld>
-    <p:spTree>
-      <p:nvGrpSpPr>
-        <p:cNvPr id="1" name=""/>
-        <p:cNvGrpSpPr/>
-        <p:nvPr/>
-      </p:nvGrpSpPr>
-      <p:grpSpPr>
-        <a:xfrm>
-          <a:off x="0" y="0"/>
-          <a:ext cx="0" cy="0"/>
-          <a:chOff x="0" y="0"/>
-          <a:chExt cx="0" cy="0"/>
-        </a:xfrm>
-      </p:grpSpPr>
-      <p:sp>
-        <p:nvSpPr>
-          <p:cNvPr id="2" name="Title 1"/>
-          <p:cNvSpPr>
-            <a:spLocks noGrp="1"/>
-          </p:cNvSpPr>
-          <p:nvPr>
-            <p:ph type="title"/>
-          </p:nvPr>
-        </p:nvSpPr>
-        <p:spPr/>
-        <p:txBody>
-          <a:bodyPr>
-            <a:normAutofit fontScale="90000"/>
-          </a:bodyPr>
-          <a:lstStyle/>
-          <a:p>
-            <a:r>
-              <a:rPr lang="en-US" dirty="0"/>
-              <a:t>The Impact of Rounding Errors </a:t>
-            </a:r>
-          </a:p>
-        </p:txBody>
-      </p:sp>
-      <p:sp>
-        <p:nvSpPr>
-          <p:cNvPr id="3" name="Footer Placeholder 2"/>
-          <p:cNvSpPr>
-            <a:spLocks noGrp="1"/>
-          </p:cNvSpPr>
-          <p:nvPr>
-            <p:ph type="ftr" sz="quarter" idx="10"/>
-          </p:nvPr>
-        </p:nvSpPr>
-        <p:spPr/>
-        <p:txBody>
-          <a:bodyPr/>
-          <a:lstStyle/>
-          <a:p>
-            <a:r>
-              <a:rPr lang="en-US" dirty="0"/>
-              <a:t>Digital Noise, Accuracy &amp; Precision</a:t>
-            </a:r>
-          </a:p>
-        </p:txBody>
-      </p:sp>
-      <p:sp>
-        <p:nvSpPr>
-          <p:cNvPr id="4" name="Text Placeholder 3"/>
-          <p:cNvSpPr>
-            <a:spLocks noGrp="1"/>
-          </p:cNvSpPr>
-          <p:nvPr>
-            <p:ph type="body" sz="quarter" idx="14"/>
-          </p:nvPr>
-        </p:nvSpPr>
-        <p:spPr/>
-        <p:txBody>
-          <a:bodyPr/>
-          <a:lstStyle/>
-          <a:p>
-            <a:r>
-              <a:rPr lang="en-US" dirty="0"/>
-              <a:t>Heading</a:t>
-            </a:r>
-          </a:p>
-          <a:p>
-            <a:pPr lvl="1"/>
-            <a:r>
-              <a:rPr lang="en-US" dirty="0"/>
-              <a:t>Text</a:t>
-            </a:r>
-          </a:p>
-          <a:p>
-            <a:pPr lvl="2"/>
-            <a:r>
-              <a:rPr lang="en-US" dirty="0"/>
-              <a:t>Bullet 1</a:t>
-            </a:r>
-          </a:p>
-          <a:p>
-            <a:pPr lvl="3"/>
-            <a:r>
-              <a:rPr lang="en-US" dirty="0"/>
-              <a:t>Bullet 2</a:t>
-            </a:r>
-          </a:p>
-          <a:p>
-            <a:pPr lvl="4"/>
-            <a:r>
-              <a:rPr lang="en-US" dirty="0"/>
-              <a:t>Bullet 3</a:t>
-            </a:r>
-          </a:p>
-        </p:txBody>
-      </p:sp>
-    </p:spTree>
-    <p:extLst>
-      <p:ext uri="{BB962C8B-B14F-4D97-AF65-F5344CB8AC3E}">
-        <p14:creationId xmlns:p14="http://schemas.microsoft.com/office/powerpoint/2010/main" val="1873256951"/>
-      </p:ext>
-    </p:extLst>
-  </p:cSld>
-  <p:clrMapOvr>
-    <a:masterClrMapping/>
-  </p:clrMapOvr>
-</p:sld>
-</file>
-
-<file path=ppt/slides/slide6.xml><?xml version="1.0" encoding="utf-8"?>
-<p:sld xmlns:a="http://schemas.openxmlformats.org/drawingml/2006/main" xmlns:r="http://schemas.openxmlformats.org/officeDocument/2006/relationships" xmlns:p="http://schemas.openxmlformats.org/presentationml/2006/main">
-  <p:cSld>
-    <p:spTree>
-      <p:nvGrpSpPr>
-        <p:cNvPr id="1" name=""/>
-        <p:cNvGrpSpPr/>
-        <p:nvPr/>
-      </p:nvGrpSpPr>
-      <p:grpSpPr>
-        <a:xfrm>
-          <a:off x="0" y="0"/>
-          <a:ext cx="0" cy="0"/>
-          <a:chOff x="0" y="0"/>
-          <a:chExt cx="0" cy="0"/>
-        </a:xfrm>
-      </p:grpSpPr>
-      <p:sp>
-        <p:nvSpPr>
-          <p:cNvPr id="2" name="Title 1"/>
-          <p:cNvSpPr>
-            <a:spLocks noGrp="1"/>
-          </p:cNvSpPr>
-          <p:nvPr>
-            <p:ph type="title"/>
-          </p:nvPr>
-        </p:nvSpPr>
-        <p:spPr>
-          <a:xfrm>
-            <a:off x="2054120" y="131051"/>
-            <a:ext cx="5845601" cy="650240"/>
-          </a:xfrm>
-        </p:spPr>
-        <p:txBody>
-          <a:bodyPr>
-            <a:normAutofit fontScale="90000"/>
-          </a:bodyPr>
-          <a:lstStyle/>
-          <a:p>
-            <a:r>
-              <a:rPr lang="en-US" dirty="0"/>
-              <a:t>The Patriot Missile Issue</a:t>
-            </a:r>
-          </a:p>
-        </p:txBody>
-      </p:sp>
-      <p:sp>
-        <p:nvSpPr>
-          <p:cNvPr id="3" name="Footer Placeholder 2"/>
-          <p:cNvSpPr>
-            <a:spLocks noGrp="1"/>
-          </p:cNvSpPr>
-          <p:nvPr>
-            <p:ph type="ftr" sz="quarter" idx="10"/>
-          </p:nvPr>
-        </p:nvSpPr>
-        <p:spPr/>
-        <p:txBody>
-          <a:bodyPr/>
-          <a:lstStyle/>
-          <a:p>
-            <a:r>
-              <a:rPr lang="en-US" dirty="0"/>
-              <a:t>Digital Noise, Accuracy &amp; Precision</a:t>
-            </a:r>
-          </a:p>
-        </p:txBody>
-      </p:sp>
-      <p:sp>
-        <p:nvSpPr>
-          <p:cNvPr id="4" name="Text Placeholder 3"/>
-          <p:cNvSpPr>
-            <a:spLocks noGrp="1"/>
-          </p:cNvSpPr>
-          <p:nvPr>
-            <p:ph type="body" sz="quarter" idx="14"/>
-          </p:nvPr>
-        </p:nvSpPr>
-        <p:spPr/>
-        <p:txBody>
-          <a:bodyPr/>
-          <a:lstStyle/>
-          <a:p>
-            <a:r>
-              <a:rPr lang="en-US" dirty="0"/>
-              <a:t>Heading</a:t>
-            </a:r>
-          </a:p>
-          <a:p>
-            <a:pPr lvl="1"/>
-            <a:r>
-              <a:rPr lang="en-US" dirty="0"/>
-              <a:t>Text</a:t>
-            </a:r>
-          </a:p>
-          <a:p>
-            <a:pPr lvl="2"/>
-            <a:r>
-              <a:rPr lang="en-US" dirty="0"/>
-              <a:t>Bullet 1</a:t>
-            </a:r>
-          </a:p>
-          <a:p>
-            <a:pPr lvl="3"/>
-            <a:r>
-              <a:rPr lang="en-US" dirty="0"/>
-              <a:t>Bullet 2</a:t>
-            </a:r>
-          </a:p>
-          <a:p>
-            <a:pPr lvl="4"/>
-            <a:r>
-              <a:rPr lang="en-US" dirty="0"/>
-              <a:t>Bullet 3</a:t>
-            </a:r>
-          </a:p>
-        </p:txBody>
-      </p:sp>
-    </p:spTree>
-    <p:extLst>
-      <p:ext uri="{BB962C8B-B14F-4D97-AF65-F5344CB8AC3E}">
-        <p14:creationId xmlns:p14="http://schemas.microsoft.com/office/powerpoint/2010/main" val="1836954211"/>
-      </p:ext>
-    </p:extLst>
-  </p:cSld>
-  <p:clrMapOvr>
-    <a:masterClrMapping/>
-  </p:clrMapOvr>
-</p:sld>
-</file>
-
-<file path=ppt/slides/slide7.xml><?xml version="1.0" encoding="utf-8"?>
-<p:sld xmlns:a="http://schemas.openxmlformats.org/drawingml/2006/main" xmlns:r="http://schemas.openxmlformats.org/officeDocument/2006/relationships" xmlns:p="http://schemas.openxmlformats.org/presentationml/2006/main">
-  <p:cSld>
-    <p:spTree>
-      <p:nvGrpSpPr>
-        <p:cNvPr id="1" name=""/>
-        <p:cNvGrpSpPr/>
-        <p:nvPr/>
-      </p:nvGrpSpPr>
-      <p:grpSpPr>
-        <a:xfrm>
-          <a:off x="0" y="0"/>
-          <a:ext cx="0" cy="0"/>
-          <a:chOff x="0" y="0"/>
-          <a:chExt cx="0" cy="0"/>
-        </a:xfrm>
-      </p:grpSpPr>
-      <p:sp>
-        <p:nvSpPr>
-          <p:cNvPr id="2" name="Title 1"/>
-          <p:cNvSpPr>
-            <a:spLocks noGrp="1"/>
-          </p:cNvSpPr>
-          <p:nvPr>
-            <p:ph type="title"/>
-          </p:nvPr>
-        </p:nvSpPr>
-        <p:spPr/>
-        <p:txBody>
-          <a:bodyPr>
-            <a:normAutofit fontScale="90000"/>
-          </a:bodyPr>
-          <a:lstStyle/>
-          <a:p>
-            <a:r>
-              <a:rPr lang="en-US" dirty="0"/>
-              <a:t>Fixed Sized Representations</a:t>
-            </a:r>
-          </a:p>
-        </p:txBody>
-      </p:sp>
-      <p:sp>
-        <p:nvSpPr>
-          <p:cNvPr id="3" name="Footer Placeholder 2"/>
-          <p:cNvSpPr>
-            <a:spLocks noGrp="1"/>
-          </p:cNvSpPr>
-          <p:nvPr>
-            <p:ph type="ftr" sz="quarter" idx="10"/>
-          </p:nvPr>
-        </p:nvSpPr>
-        <p:spPr/>
-        <p:txBody>
-          <a:bodyPr/>
-          <a:lstStyle/>
-          <a:p>
-            <a:r>
-              <a:rPr lang="en-US" dirty="0"/>
-              <a:t>Digital Noise, Accuracy &amp; Precision</a:t>
-            </a:r>
-          </a:p>
-        </p:txBody>
-      </p:sp>
-      <p:sp>
-        <p:nvSpPr>
-          <p:cNvPr id="4" name="Text Placeholder 3"/>
-          <p:cNvSpPr>
-            <a:spLocks noGrp="1"/>
-          </p:cNvSpPr>
-          <p:nvPr>
-            <p:ph type="body" sz="quarter" idx="14"/>
-          </p:nvPr>
-        </p:nvSpPr>
-        <p:spPr/>
-        <p:txBody>
-          <a:bodyPr/>
-          <a:lstStyle/>
-          <a:p>
-            <a:r>
-              <a:rPr lang="en-US" dirty="0"/>
-              <a:t>Heading</a:t>
-            </a:r>
-          </a:p>
-          <a:p>
-            <a:pPr lvl="1"/>
-            <a:r>
-              <a:rPr lang="en-US" dirty="0"/>
-              <a:t>Text</a:t>
-            </a:r>
-          </a:p>
-          <a:p>
-            <a:pPr lvl="2"/>
-            <a:r>
-              <a:rPr lang="en-US" dirty="0"/>
-              <a:t>Bullet 1</a:t>
-            </a:r>
-          </a:p>
-          <a:p>
-            <a:pPr lvl="3"/>
-            <a:r>
-              <a:rPr lang="en-US" dirty="0"/>
-              <a:t>Bullet 2</a:t>
-            </a:r>
-          </a:p>
-          <a:p>
-            <a:pPr lvl="4"/>
-            <a:r>
-              <a:rPr lang="en-US" dirty="0"/>
-              <a:t>Bullet 3</a:t>
-            </a:r>
-          </a:p>
-        </p:txBody>
-      </p:sp>
-    </p:spTree>
-    <p:extLst>
-      <p:ext uri="{BB962C8B-B14F-4D97-AF65-F5344CB8AC3E}">
-        <p14:creationId xmlns:p14="http://schemas.microsoft.com/office/powerpoint/2010/main" val="2057417950"/>
-      </p:ext>
-    </p:extLst>
-  </p:cSld>
-  <p:clrMapOvr>
-    <a:masterClrMapping/>
-  </p:clrMapOvr>
-</p:sld>
-</file>
-
-<file path=ppt/slides/slide8.xml><?xml version="1.0" encoding="utf-8"?>
-<p:sld xmlns:a="http://schemas.openxmlformats.org/drawingml/2006/main" xmlns:r="http://schemas.openxmlformats.org/officeDocument/2006/relationships" xmlns:p="http://schemas.openxmlformats.org/presentationml/2006/main">
-  <p:cSld>
-    <p:spTree>
-      <p:nvGrpSpPr>
-        <p:cNvPr id="1" name=""/>
-        <p:cNvGrpSpPr/>
-        <p:nvPr/>
-      </p:nvGrpSpPr>
-      <p:grpSpPr>
-        <a:xfrm>
-          <a:off x="0" y="0"/>
-          <a:ext cx="0" cy="0"/>
-          <a:chOff x="0" y="0"/>
-          <a:chExt cx="0" cy="0"/>
-        </a:xfrm>
-      </p:grpSpPr>
-      <p:sp>
-        <p:nvSpPr>
-          <p:cNvPr id="2" name="Title 1"/>
-          <p:cNvSpPr>
-            <a:spLocks noGrp="1"/>
-          </p:cNvSpPr>
-          <p:nvPr>
-            <p:ph type="title"/>
-          </p:nvPr>
-        </p:nvSpPr>
-        <p:spPr/>
-        <p:txBody>
-          <a:bodyPr>
-            <a:normAutofit fontScale="90000"/>
-          </a:bodyPr>
-          <a:lstStyle/>
-          <a:p>
-            <a:r>
-              <a:rPr lang="en-US" dirty="0"/>
-              <a:t>Variable Sized Representations</a:t>
-            </a:r>
-          </a:p>
-        </p:txBody>
-      </p:sp>
-      <p:sp>
-        <p:nvSpPr>
-          <p:cNvPr id="3" name="Footer Placeholder 2"/>
-          <p:cNvSpPr>
-            <a:spLocks noGrp="1"/>
-          </p:cNvSpPr>
-          <p:nvPr>
-            <p:ph type="ftr" sz="quarter" idx="10"/>
-          </p:nvPr>
-        </p:nvSpPr>
-        <p:spPr/>
-        <p:txBody>
-          <a:bodyPr/>
-          <a:lstStyle/>
-          <a:p>
-            <a:r>
-              <a:rPr lang="en-US" dirty="0"/>
-              <a:t>Digital Noise, Accuracy &amp; Precision</a:t>
-            </a:r>
-          </a:p>
-        </p:txBody>
-      </p:sp>
-      <p:sp>
-        <p:nvSpPr>
-          <p:cNvPr id="4" name="Text Placeholder 3"/>
-          <p:cNvSpPr>
-            <a:spLocks noGrp="1"/>
-          </p:cNvSpPr>
-          <p:nvPr>
-            <p:ph type="body" sz="quarter" idx="14"/>
-          </p:nvPr>
-        </p:nvSpPr>
-        <p:spPr/>
-        <p:txBody>
-          <a:bodyPr/>
-          <a:lstStyle/>
-          <a:p>
-            <a:r>
-              <a:rPr lang="en-US" dirty="0"/>
-              <a:t>Heading</a:t>
-            </a:r>
-          </a:p>
-          <a:p>
-            <a:pPr lvl="1"/>
-            <a:r>
-              <a:rPr lang="en-US" dirty="0"/>
-              <a:t>Text</a:t>
-            </a:r>
-          </a:p>
-          <a:p>
-            <a:pPr lvl="2"/>
-            <a:r>
-              <a:rPr lang="en-US" dirty="0"/>
-              <a:t>Bullet 1</a:t>
-            </a:r>
-          </a:p>
-          <a:p>
-            <a:pPr lvl="3"/>
-            <a:r>
-              <a:rPr lang="en-US" dirty="0"/>
-              <a:t>Bullet 2</a:t>
-            </a:r>
-          </a:p>
-          <a:p>
-            <a:pPr lvl="4"/>
-            <a:r>
-              <a:rPr lang="en-US" dirty="0"/>
-              <a:t>Bullet 3</a:t>
             </a:r>
           </a:p>
         </p:txBody>
@@ -4032,21 +4317,8 @@
           <a:p>
             <a:r>
               <a:rPr lang="en-US" dirty="0"/>
-              <a:t>The </a:t>
-            </a:r>
-            <a:r>
-              <a:rPr lang="en-US" dirty="0" err="1"/>
-              <a:t>Ubox</a:t>
-            </a:r>
-            <a:r>
-              <a:rPr lang="en-US" dirty="0"/>
-              <a:t> follows from </a:t>
-            </a:r>
-            <a:r>
-              <a:rPr lang="en-US" dirty="0" err="1"/>
-              <a:t>Unums</a:t>
-            </a:r>
-            <a:endParaRPr lang="en-US" dirty="0"/>
+              <a:t>The Ubox follows from the Unum</a:t>
+            </a:r>
           </a:p>
         </p:txBody>
       </p:sp>
@@ -4082,42 +4354,172 @@
             <p:ph type="body" sz="quarter" idx="14"/>
           </p:nvPr>
         </p:nvSpPr>
-        <p:spPr/>
+        <p:spPr>
+          <a:xfrm>
+            <a:off x="150471" y="1158876"/>
+            <a:ext cx="8769692" cy="2128334"/>
+          </a:xfrm>
+        </p:spPr>
         <p:txBody>
           <a:bodyPr/>
           <a:lstStyle/>
           <a:p>
             <a:r>
               <a:rPr lang="en-US" dirty="0"/>
-              <a:t>Heading</a:t>
-            </a:r>
-          </a:p>
-          <a:p>
-            <a:pPr lvl="1"/>
-            <a:r>
-              <a:rPr lang="en-US" dirty="0"/>
-              <a:t>Text</a:t>
+              <a:t>A Ubox is an extension of Unums to n-dimensions</a:t>
             </a:r>
           </a:p>
           <a:p>
             <a:pPr lvl="2"/>
             <a:r>
               <a:rPr lang="en-US" dirty="0"/>
-              <a:t>Bullet 1</a:t>
-            </a:r>
-          </a:p>
-          <a:p>
-            <a:pPr lvl="3"/>
-            <a:r>
-              <a:rPr lang="en-US" dirty="0"/>
-              <a:t>Bullet 2</a:t>
-            </a:r>
-          </a:p>
-          <a:p>
-            <a:pPr lvl="4"/>
-            <a:r>
-              <a:rPr lang="en-US" dirty="0"/>
-              <a:t>Bullet 3</a:t>
+              <a:t>Unums have the ability to exist as a float or as an open interval between floats</a:t>
+            </a:r>
+          </a:p>
+          <a:p>
+            <a:pPr lvl="2"/>
+            <a:r>
+              <a:rPr lang="en-US" dirty="0" err="1"/>
+              <a:t>Uboxes</a:t>
+            </a:r>
+            <a:r>
+              <a:rPr lang="en-US" dirty="0"/>
+              <a:t> generalize </a:t>
+            </a:r>
+            <a:r>
+              <a:rPr lang="en-US" dirty="0" err="1"/>
+              <a:t>unums</a:t>
+            </a:r>
+            <a:r>
+              <a:rPr lang="en-US" dirty="0"/>
+              <a:t> by being </a:t>
+            </a:r>
+            <a:r>
+              <a:rPr lang="en-US" dirty="0" err="1"/>
+              <a:t>being</a:t>
+            </a:r>
+            <a:r>
+              <a:rPr lang="en-US" dirty="0"/>
+              <a:t> able to be precise/open in multiple dimensions</a:t>
+            </a:r>
+          </a:p>
+        </p:txBody>
+      </p:sp>
+      <p:pic>
+        <p:nvPicPr>
+          <p:cNvPr id="5" name="Picture 4"/>
+          <p:cNvPicPr>
+            <a:picLocks noChangeAspect="1"/>
+          </p:cNvPicPr>
+          <p:nvPr/>
+        </p:nvPicPr>
+        <p:blipFill>
+          <a:blip r:embed="rId2"/>
+          <a:stretch>
+            <a:fillRect/>
+          </a:stretch>
+        </p:blipFill>
+        <p:spPr>
+          <a:xfrm>
+            <a:off x="421447" y="3663766"/>
+            <a:ext cx="4422736" cy="2270250"/>
+          </a:xfrm>
+          <a:prstGeom prst="rect">
+            <a:avLst/>
+          </a:prstGeom>
+        </p:spPr>
+      </p:pic>
+      <p:sp>
+        <p:nvSpPr>
+          <p:cNvPr id="7" name="TextBox 6"/>
+          <p:cNvSpPr txBox="1"/>
+          <p:nvPr/>
+        </p:nvSpPr>
+        <p:spPr>
+          <a:xfrm>
+            <a:off x="5388015" y="3921728"/>
+            <a:ext cx="3159889" cy="1754326"/>
+          </a:xfrm>
+          <a:prstGeom prst="rect">
+            <a:avLst/>
+          </a:prstGeom>
+          <a:noFill/>
+        </p:spPr>
+        <p:txBody>
+          <a:bodyPr wrap="square" rtlCol="0">
+            <a:spAutoFit/>
+          </a:bodyPr>
+          <a:lstStyle/>
+          <a:p>
+            <a:r>
+              <a:rPr lang="en-AU" i="1" dirty="0">
+                <a:solidFill>
+                  <a:schemeClr val="accent5"/>
+                </a:solidFill>
+              </a:rPr>
+              <a:t>Different ‘forms’ of a 2D Ubox</a:t>
+            </a:r>
+          </a:p>
+          <a:p>
+            <a:r>
+              <a:rPr lang="en-AU" i="1" dirty="0">
+                <a:solidFill>
+                  <a:schemeClr val="accent5"/>
+                </a:solidFill>
+              </a:rPr>
+              <a:t>From left to right:</a:t>
+            </a:r>
+          </a:p>
+          <a:p>
+            <a:pPr marL="400050" indent="-400050">
+              <a:buAutoNum type="romanLcParenR"/>
+            </a:pPr>
+            <a:r>
+              <a:rPr lang="en-AU" i="1" dirty="0">
+                <a:solidFill>
+                  <a:schemeClr val="accent5"/>
+                </a:solidFill>
+              </a:rPr>
+              <a:t>Precise in both dimensions</a:t>
+            </a:r>
+          </a:p>
+          <a:p>
+            <a:pPr marL="400050" indent="-400050">
+              <a:buAutoNum type="romanLcParenR"/>
+            </a:pPr>
+            <a:r>
+              <a:rPr lang="en-AU" i="1" dirty="0">
+                <a:solidFill>
+                  <a:schemeClr val="accent5"/>
+                </a:solidFill>
+              </a:rPr>
+              <a:t>Precise in x, open in y</a:t>
+            </a:r>
+          </a:p>
+          <a:p>
+            <a:pPr marL="400050" indent="-400050">
+              <a:buAutoNum type="romanLcParenR"/>
+            </a:pPr>
+            <a:r>
+              <a:rPr lang="en-AU" i="1" dirty="0">
+                <a:solidFill>
+                  <a:schemeClr val="accent5"/>
+                </a:solidFill>
+              </a:rPr>
+              <a:t>Precise in y, open in x</a:t>
+            </a:r>
+          </a:p>
+          <a:p>
+            <a:pPr marL="400050" indent="-400050">
+              <a:buAutoNum type="romanLcParenR"/>
+            </a:pPr>
+            <a:r>
+              <a:rPr lang="en-AU" i="1" dirty="0">
+                <a:solidFill>
+                  <a:schemeClr val="accent5"/>
+                </a:solidFill>
+              </a:rPr>
+              <a:t>Open in both dimensions</a:t>
             </a:r>
           </a:p>
         </p:txBody>
@@ -4125,7 +4527,7 @@
     </p:spTree>
     <p:extLst>
       <p:ext uri="{BB962C8B-B14F-4D97-AF65-F5344CB8AC3E}">
-        <p14:creationId xmlns:p14="http://schemas.microsoft.com/office/powerpoint/2010/main" val="4062126938"/>
+        <p14:creationId xmlns:p14="http://schemas.microsoft.com/office/powerpoint/2010/main" val="1316505308"/>
       </p:ext>
     </p:extLst>
   </p:cSld>

</xml_diff>